<commit_message>
Update DeveloperGuide and add UML diagram for MassEdit
</commit_message>
<xml_diff>
--- a/docs/diagrams/FindCommandSequenceDiagram.pptx
+++ b/docs/diagrams/FindCommandSequenceDiagram.pptx
@@ -208,7 +208,7 @@
           <a:p>
             <a:fld id="{21B4A92B-49AE-402A-A902-897E65F183DA}" type="datetimeFigureOut">
               <a:rPr lang="zh-CN" altLang="en-US" smtClean="0"/>
-              <a:t>2018/10/24</a:t>
+              <a:t>2018/10/31</a:t>
             </a:fld>
             <a:endParaRPr lang="zh-CN" altLang="en-US"/>
           </a:p>
@@ -738,7 +738,7 @@
           <a:p>
             <a:fld id="{530820CF-B880-4189-942D-D702A7CBA730}" type="datetimeFigureOut">
               <a:rPr lang="zh-CN" altLang="en-US" smtClean="0"/>
-              <a:t>2018/10/24</a:t>
+              <a:t>2018/10/31</a:t>
             </a:fld>
             <a:endParaRPr lang="zh-CN" altLang="en-US"/>
           </a:p>
@@ -901,7 +901,7 @@
           <a:p>
             <a:fld id="{530820CF-B880-4189-942D-D702A7CBA730}" type="datetimeFigureOut">
               <a:rPr lang="zh-CN" altLang="en-US" smtClean="0"/>
-              <a:t>2018/10/24</a:t>
+              <a:t>2018/10/31</a:t>
             </a:fld>
             <a:endParaRPr lang="zh-CN" altLang="en-US"/>
           </a:p>
@@ -1074,7 +1074,7 @@
           <a:p>
             <a:fld id="{530820CF-B880-4189-942D-D702A7CBA730}" type="datetimeFigureOut">
               <a:rPr lang="zh-CN" altLang="en-US" smtClean="0"/>
-              <a:t>2018/10/24</a:t>
+              <a:t>2018/10/31</a:t>
             </a:fld>
             <a:endParaRPr lang="zh-CN" altLang="en-US"/>
           </a:p>
@@ -1237,7 +1237,7 @@
           <a:p>
             <a:fld id="{530820CF-B880-4189-942D-D702A7CBA730}" type="datetimeFigureOut">
               <a:rPr lang="zh-CN" altLang="en-US" smtClean="0"/>
-              <a:t>2018/10/24</a:t>
+              <a:t>2018/10/31</a:t>
             </a:fld>
             <a:endParaRPr lang="zh-CN" altLang="en-US"/>
           </a:p>
@@ -1477,7 +1477,7 @@
           <a:p>
             <a:fld id="{530820CF-B880-4189-942D-D702A7CBA730}" type="datetimeFigureOut">
               <a:rPr lang="zh-CN" altLang="en-US" smtClean="0"/>
-              <a:t>2018/10/24</a:t>
+              <a:t>2018/10/31</a:t>
             </a:fld>
             <a:endParaRPr lang="zh-CN" altLang="en-US"/>
           </a:p>
@@ -1757,7 +1757,7 @@
           <a:p>
             <a:fld id="{530820CF-B880-4189-942D-D702A7CBA730}" type="datetimeFigureOut">
               <a:rPr lang="zh-CN" altLang="en-US" smtClean="0"/>
-              <a:t>2018/10/24</a:t>
+              <a:t>2018/10/31</a:t>
             </a:fld>
             <a:endParaRPr lang="zh-CN" altLang="en-US"/>
           </a:p>
@@ -2171,7 +2171,7 @@
           <a:p>
             <a:fld id="{530820CF-B880-4189-942D-D702A7CBA730}" type="datetimeFigureOut">
               <a:rPr lang="zh-CN" altLang="en-US" smtClean="0"/>
-              <a:t>2018/10/24</a:t>
+              <a:t>2018/10/31</a:t>
             </a:fld>
             <a:endParaRPr lang="zh-CN" altLang="en-US"/>
           </a:p>
@@ -2283,7 +2283,7 @@
           <a:p>
             <a:fld id="{530820CF-B880-4189-942D-D702A7CBA730}" type="datetimeFigureOut">
               <a:rPr lang="zh-CN" altLang="en-US" smtClean="0"/>
-              <a:t>2018/10/24</a:t>
+              <a:t>2018/10/31</a:t>
             </a:fld>
             <a:endParaRPr lang="zh-CN" altLang="en-US"/>
           </a:p>
@@ -2373,7 +2373,7 @@
           <a:p>
             <a:fld id="{530820CF-B880-4189-942D-D702A7CBA730}" type="datetimeFigureOut">
               <a:rPr lang="zh-CN" altLang="en-US" smtClean="0"/>
-              <a:t>2018/10/24</a:t>
+              <a:t>2018/10/31</a:t>
             </a:fld>
             <a:endParaRPr lang="zh-CN" altLang="en-US"/>
           </a:p>
@@ -2643,7 +2643,7 @@
           <a:p>
             <a:fld id="{530820CF-B880-4189-942D-D702A7CBA730}" type="datetimeFigureOut">
               <a:rPr lang="zh-CN" altLang="en-US" smtClean="0"/>
-              <a:t>2018/10/24</a:t>
+              <a:t>2018/10/31</a:t>
             </a:fld>
             <a:endParaRPr lang="zh-CN" altLang="en-US"/>
           </a:p>
@@ -2890,7 +2890,7 @@
           <a:p>
             <a:fld id="{530820CF-B880-4189-942D-D702A7CBA730}" type="datetimeFigureOut">
               <a:rPr lang="zh-CN" altLang="en-US" smtClean="0"/>
-              <a:t>2018/10/24</a:t>
+              <a:t>2018/10/31</a:t>
             </a:fld>
             <a:endParaRPr lang="zh-CN" altLang="en-US"/>
           </a:p>
@@ -3096,7 +3096,7 @@
           <a:p>
             <a:fld id="{530820CF-B880-4189-942D-D702A7CBA730}" type="datetimeFigureOut">
               <a:rPr lang="zh-CN" altLang="en-US" smtClean="0"/>
-              <a:t>2018/10/24</a:t>
+              <a:t>2018/10/31</a:t>
             </a:fld>
             <a:endParaRPr lang="zh-CN" altLang="en-US"/>
           </a:p>
@@ -4049,79 +4049,6 @@
           </a:p>
         </p:txBody>
       </p:sp>
-      <p:sp>
-        <p:nvSpPr>
-          <p:cNvPr id="11" name="Rectangle 62">
-            <a:extLst>
-              <a:ext uri="{FF2B5EF4-FFF2-40B4-BE49-F238E27FC236}">
-                <a16:creationId xmlns:a16="http://schemas.microsoft.com/office/drawing/2014/main" id="{F7333EA7-C5B4-47DF-BAF9-36733374F553}"/>
-              </a:ext>
-            </a:extLst>
-          </p:cNvPr>
-          <p:cNvSpPr/>
-          <p:nvPr/>
-        </p:nvSpPr>
-        <p:spPr>
-          <a:xfrm>
-            <a:off x="6413494" y="1170057"/>
-            <a:ext cx="1093635" cy="461538"/>
-          </a:xfrm>
-          <a:prstGeom prst="rect">
-            <a:avLst/>
-          </a:prstGeom>
-          <a:solidFill>
-            <a:srgbClr val="0070C0"/>
-          </a:solidFill>
-          <a:ln w="19050">
-            <a:solidFill>
-              <a:srgbClr val="0070C0"/>
-            </a:solidFill>
-          </a:ln>
-          <a:effectLst/>
-        </p:spPr>
-        <p:style>
-          <a:lnRef idx="1">
-            <a:schemeClr val="accent2"/>
-          </a:lnRef>
-          <a:fillRef idx="2">
-            <a:schemeClr val="accent2"/>
-          </a:fillRef>
-          <a:effectRef idx="1">
-            <a:schemeClr val="accent2"/>
-          </a:effectRef>
-          <a:fontRef idx="minor">
-            <a:schemeClr val="dk1"/>
-          </a:fontRef>
-        </p:style>
-        <p:txBody>
-          <a:bodyPr rtlCol="0" anchor="ctr"/>
-          <a:lstStyle/>
-          <a:p>
-            <a:pPr algn="ctr"/>
-            <a:r>
-              <a:rPr lang="en-US" sz="1600" dirty="0">
-                <a:solidFill>
-                  <a:schemeClr val="bg1"/>
-                </a:solidFill>
-              </a:rPr>
-              <a:t>:</a:t>
-            </a:r>
-            <a:r>
-              <a:rPr lang="en-US" sz="1600" dirty="0" err="1">
-                <a:solidFill>
-                  <a:schemeClr val="bg1"/>
-                </a:solidFill>
-              </a:rPr>
-              <a:t>ArgumentTokenizer</a:t>
-            </a:r>
-            <a:endParaRPr lang="en-SG" sz="1600" dirty="0">
-              <a:solidFill>
-                <a:schemeClr val="bg1"/>
-              </a:solidFill>
-            </a:endParaRPr>
-          </a:p>
-        </p:txBody>
-      </p:sp>
       <p:cxnSp>
         <p:nvCxnSpPr>
           <p:cNvPr id="14" name="Straight Arrow Connector 22">
@@ -4704,7 +4631,7 @@
         </p:nvSpPr>
         <p:spPr>
           <a:xfrm>
-            <a:off x="3352800" y="1981200"/>
+            <a:off x="3382988" y="2058056"/>
             <a:ext cx="1042552" cy="184666"/>
           </a:xfrm>
           <a:prstGeom prst="rect">
@@ -6204,7 +6131,7 @@
         </p:nvSpPr>
         <p:spPr>
           <a:xfrm>
-            <a:off x="5157260" y="2654614"/>
+            <a:off x="5196906" y="2523943"/>
             <a:ext cx="1201243" cy="169277"/>
           </a:xfrm>
           <a:prstGeom prst="rect">
@@ -6237,51 +6164,6 @@
           </a:p>
         </p:txBody>
       </p:sp>
-      <p:cxnSp>
-        <p:nvCxnSpPr>
-          <p:cNvPr id="90" name="Curved Connector 12">
-            <a:extLst>
-              <a:ext uri="{FF2B5EF4-FFF2-40B4-BE49-F238E27FC236}">
-                <a16:creationId xmlns:a16="http://schemas.microsoft.com/office/drawing/2014/main" id="{1E8F7216-60A0-4BD2-8408-1BD97F900254}"/>
-              </a:ext>
-            </a:extLst>
-          </p:cNvPr>
-          <p:cNvCxnSpPr/>
-          <p:nvPr/>
-        </p:nvCxnSpPr>
-        <p:spPr>
-          <a:xfrm rot="16200000" flipH="1">
-            <a:off x="4830475" y="3214573"/>
-            <a:ext cx="156923" cy="76200"/>
-          </a:xfrm>
-          <a:prstGeom prst="curvedConnector4">
-            <a:avLst>
-              <a:gd name="adj1" fmla="val -145677"/>
-              <a:gd name="adj2" fmla="val 400000"/>
-            </a:avLst>
-          </a:prstGeom>
-          <a:ln>
-            <a:solidFill>
-              <a:schemeClr val="accent1"/>
-            </a:solidFill>
-            <a:tailEnd type="triangle"/>
-          </a:ln>
-        </p:spPr>
-        <p:style>
-          <a:lnRef idx="1">
-            <a:schemeClr val="accent1"/>
-          </a:lnRef>
-          <a:fillRef idx="0">
-            <a:schemeClr val="accent1"/>
-          </a:fillRef>
-          <a:effectRef idx="0">
-            <a:schemeClr val="accent1"/>
-          </a:effectRef>
-          <a:fontRef idx="minor">
-            <a:schemeClr val="tx1"/>
-          </a:fontRef>
-        </p:style>
-      </p:cxnSp>
       <p:sp>
         <p:nvSpPr>
           <p:cNvPr id="91" name="TextBox 81">
@@ -6296,7 +6178,7 @@
         </p:nvSpPr>
         <p:spPr>
           <a:xfrm>
-            <a:off x="5177276" y="2921045"/>
+            <a:off x="5206181" y="2830453"/>
             <a:ext cx="1883351" cy="338554"/>
           </a:xfrm>
           <a:prstGeom prst="rect">
@@ -6522,7 +6404,7 @@
         </p:nvSpPr>
         <p:spPr>
           <a:xfrm>
-            <a:off x="4906611" y="3379201"/>
+            <a:off x="6029857" y="3395248"/>
             <a:ext cx="1524310" cy="338554"/>
           </a:xfrm>
           <a:prstGeom prst="rect">
@@ -6718,6 +6600,341 @@
           </a:p>
         </p:txBody>
       </p:sp>
+      <p:sp>
+        <p:nvSpPr>
+          <p:cNvPr id="65" name="Rectangle 62">
+            <a:extLst>
+              <a:ext uri="{FF2B5EF4-FFF2-40B4-BE49-F238E27FC236}">
+                <a16:creationId xmlns:a16="http://schemas.microsoft.com/office/drawing/2014/main" id="{A9F490DA-C70C-47E7-8485-C21329091D98}"/>
+              </a:ext>
+            </a:extLst>
+          </p:cNvPr>
+          <p:cNvSpPr/>
+          <p:nvPr/>
+        </p:nvSpPr>
+        <p:spPr>
+          <a:xfrm>
+            <a:off x="6417220" y="1317099"/>
+            <a:ext cx="1093635" cy="461538"/>
+          </a:xfrm>
+          <a:prstGeom prst="rect">
+            <a:avLst/>
+          </a:prstGeom>
+          <a:solidFill>
+            <a:srgbClr val="0070C0"/>
+          </a:solidFill>
+          <a:ln w="19050">
+            <a:solidFill>
+              <a:srgbClr val="0070C0"/>
+            </a:solidFill>
+          </a:ln>
+          <a:effectLst/>
+        </p:spPr>
+        <p:style>
+          <a:lnRef idx="1">
+            <a:schemeClr val="accent2"/>
+          </a:lnRef>
+          <a:fillRef idx="2">
+            <a:schemeClr val="accent2"/>
+          </a:fillRef>
+          <a:effectRef idx="1">
+            <a:schemeClr val="accent2"/>
+          </a:effectRef>
+          <a:fontRef idx="minor">
+            <a:schemeClr val="dk1"/>
+          </a:fontRef>
+        </p:style>
+        <p:txBody>
+          <a:bodyPr rtlCol="0" anchor="ctr"/>
+          <a:lstStyle/>
+          <a:p>
+            <a:pPr algn="ctr"/>
+            <a:r>
+              <a:rPr lang="en-US" sz="1600" dirty="0">
+                <a:solidFill>
+                  <a:schemeClr val="bg1"/>
+                </a:solidFill>
+              </a:rPr>
+              <a:t>:</a:t>
+            </a:r>
+            <a:r>
+              <a:rPr lang="en-US" sz="1600" dirty="0" err="1">
+                <a:solidFill>
+                  <a:schemeClr val="bg1"/>
+                </a:solidFill>
+              </a:rPr>
+              <a:t>ArgumentTokenizer</a:t>
+            </a:r>
+            <a:endParaRPr lang="en-SG" sz="1600" dirty="0">
+              <a:solidFill>
+                <a:schemeClr val="bg1"/>
+              </a:solidFill>
+            </a:endParaRPr>
+          </a:p>
+        </p:txBody>
+      </p:sp>
+      <p:cxnSp>
+        <p:nvCxnSpPr>
+          <p:cNvPr id="66" name="Straight Connector 45">
+            <a:extLst>
+              <a:ext uri="{FF2B5EF4-FFF2-40B4-BE49-F238E27FC236}">
+                <a16:creationId xmlns:a16="http://schemas.microsoft.com/office/drawing/2014/main" id="{214E65F1-C3B4-457E-BC88-1388A1748C64}"/>
+              </a:ext>
+            </a:extLst>
+          </p:cNvPr>
+          <p:cNvCxnSpPr>
+            <a:cxnSpLocks/>
+          </p:cNvCxnSpPr>
+          <p:nvPr/>
+        </p:nvCxnSpPr>
+        <p:spPr>
+          <a:xfrm>
+            <a:off x="7721088" y="2409569"/>
+            <a:ext cx="0" cy="759438"/>
+          </a:xfrm>
+          <a:prstGeom prst="line">
+            <a:avLst/>
+          </a:prstGeom>
+          <a:ln w="19050">
+            <a:solidFill>
+              <a:srgbClr val="0070C0"/>
+            </a:solidFill>
+            <a:prstDash val="sysDash"/>
+          </a:ln>
+          <a:effectLst/>
+        </p:spPr>
+        <p:style>
+          <a:lnRef idx="1">
+            <a:schemeClr val="accent1"/>
+          </a:lnRef>
+          <a:fillRef idx="2">
+            <a:schemeClr val="accent1"/>
+          </a:fillRef>
+          <a:effectRef idx="1">
+            <a:schemeClr val="accent1"/>
+          </a:effectRef>
+          <a:fontRef idx="minor">
+            <a:schemeClr val="dk1"/>
+          </a:fontRef>
+        </p:style>
+      </p:cxnSp>
+      <p:sp>
+        <p:nvSpPr>
+          <p:cNvPr id="11" name="Rectangle 62">
+            <a:extLst>
+              <a:ext uri="{FF2B5EF4-FFF2-40B4-BE49-F238E27FC236}">
+                <a16:creationId xmlns:a16="http://schemas.microsoft.com/office/drawing/2014/main" id="{F7333EA7-C5B4-47DF-BAF9-36733374F553}"/>
+              </a:ext>
+            </a:extLst>
+          </p:cNvPr>
+          <p:cNvSpPr/>
+          <p:nvPr/>
+        </p:nvSpPr>
+        <p:spPr>
+          <a:xfrm>
+            <a:off x="7159710" y="2221099"/>
+            <a:ext cx="1078291" cy="535675"/>
+          </a:xfrm>
+          <a:prstGeom prst="rect">
+            <a:avLst/>
+          </a:prstGeom>
+          <a:solidFill>
+            <a:srgbClr val="0070C0"/>
+          </a:solidFill>
+          <a:ln w="19050">
+            <a:solidFill>
+              <a:srgbClr val="0070C0"/>
+            </a:solidFill>
+          </a:ln>
+          <a:effectLst/>
+        </p:spPr>
+        <p:style>
+          <a:lnRef idx="1">
+            <a:schemeClr val="accent2"/>
+          </a:lnRef>
+          <a:fillRef idx="2">
+            <a:schemeClr val="accent2"/>
+          </a:fillRef>
+          <a:effectRef idx="1">
+            <a:schemeClr val="accent2"/>
+          </a:effectRef>
+          <a:fontRef idx="minor">
+            <a:schemeClr val="dk1"/>
+          </a:fontRef>
+        </p:style>
+        <p:txBody>
+          <a:bodyPr rtlCol="0" anchor="ctr"/>
+          <a:lstStyle/>
+          <a:p>
+            <a:pPr algn="ctr"/>
+            <a:r>
+              <a:rPr lang="en-US" sz="1600" dirty="0">
+                <a:solidFill>
+                  <a:schemeClr val="bg1"/>
+                </a:solidFill>
+              </a:rPr>
+              <a:t>:</a:t>
+            </a:r>
+            <a:r>
+              <a:rPr lang="en-US" sz="1600" dirty="0" err="1">
+                <a:solidFill>
+                  <a:schemeClr val="bg1"/>
+                </a:solidFill>
+              </a:rPr>
+              <a:t>ParserUtil</a:t>
+            </a:r>
+            <a:endParaRPr lang="en-SG" sz="1600" dirty="0">
+              <a:solidFill>
+                <a:schemeClr val="bg1"/>
+              </a:solidFill>
+            </a:endParaRPr>
+          </a:p>
+        </p:txBody>
+      </p:sp>
+      <p:sp>
+        <p:nvSpPr>
+          <p:cNvPr id="67" name="Rectangle 48">
+            <a:extLst>
+              <a:ext uri="{FF2B5EF4-FFF2-40B4-BE49-F238E27FC236}">
+                <a16:creationId xmlns:a16="http://schemas.microsoft.com/office/drawing/2014/main" id="{443916A2-D9BB-46AC-88EB-77701CFEFA75}"/>
+              </a:ext>
+            </a:extLst>
+          </p:cNvPr>
+          <p:cNvSpPr/>
+          <p:nvPr/>
+        </p:nvSpPr>
+        <p:spPr>
+          <a:xfrm>
+            <a:off x="7630593" y="3109146"/>
+            <a:ext cx="164356" cy="221989"/>
+          </a:xfrm>
+          <a:prstGeom prst="rect">
+            <a:avLst/>
+          </a:prstGeom>
+          <a:solidFill>
+            <a:srgbClr val="0070C0"/>
+          </a:solidFill>
+          <a:ln>
+            <a:solidFill>
+              <a:srgbClr val="0070C0"/>
+            </a:solidFill>
+          </a:ln>
+          <a:effectLst/>
+        </p:spPr>
+        <p:style>
+          <a:lnRef idx="1">
+            <a:schemeClr val="accent3"/>
+          </a:lnRef>
+          <a:fillRef idx="2">
+            <a:schemeClr val="accent3"/>
+          </a:fillRef>
+          <a:effectRef idx="1">
+            <a:schemeClr val="accent3"/>
+          </a:effectRef>
+          <a:fontRef idx="minor">
+            <a:schemeClr val="dk1"/>
+          </a:fontRef>
+        </p:style>
+        <p:txBody>
+          <a:bodyPr rtlCol="0" anchor="ctr"/>
+          <a:lstStyle/>
+          <a:p>
+            <a:pPr algn="ctr"/>
+            <a:endParaRPr lang="en-SG" sz="1400" dirty="0"/>
+          </a:p>
+        </p:txBody>
+      </p:sp>
+      <p:cxnSp>
+        <p:nvCxnSpPr>
+          <p:cNvPr id="68" name="Straight Arrow Connector 27">
+            <a:extLst>
+              <a:ext uri="{FF2B5EF4-FFF2-40B4-BE49-F238E27FC236}">
+                <a16:creationId xmlns:a16="http://schemas.microsoft.com/office/drawing/2014/main" id="{28027039-A2D2-4D8F-B768-F6E8652CF69F}"/>
+              </a:ext>
+            </a:extLst>
+          </p:cNvPr>
+          <p:cNvCxnSpPr>
+            <a:cxnSpLocks/>
+          </p:cNvCxnSpPr>
+          <p:nvPr/>
+        </p:nvCxnSpPr>
+        <p:spPr>
+          <a:xfrm>
+            <a:off x="4825039" y="3144235"/>
+            <a:ext cx="2792070" cy="0"/>
+          </a:xfrm>
+          <a:prstGeom prst="straightConnector1">
+            <a:avLst/>
+          </a:prstGeom>
+          <a:ln w="19050">
+            <a:solidFill>
+              <a:srgbClr val="0070C0"/>
+            </a:solidFill>
+            <a:tailEnd type="arrow"/>
+          </a:ln>
+        </p:spPr>
+        <p:style>
+          <a:lnRef idx="1">
+            <a:schemeClr val="accent1"/>
+          </a:lnRef>
+          <a:fillRef idx="0">
+            <a:schemeClr val="accent1"/>
+          </a:fillRef>
+          <a:effectRef idx="0">
+            <a:schemeClr val="accent1"/>
+          </a:effectRef>
+          <a:fontRef idx="minor">
+            <a:schemeClr val="tx1"/>
+          </a:fontRef>
+        </p:style>
+      </p:cxnSp>
+      <p:cxnSp>
+        <p:nvCxnSpPr>
+          <p:cNvPr id="71" name="Straight Arrow Connector 33">
+            <a:extLst>
+              <a:ext uri="{FF2B5EF4-FFF2-40B4-BE49-F238E27FC236}">
+                <a16:creationId xmlns:a16="http://schemas.microsoft.com/office/drawing/2014/main" id="{74456E29-7372-41B2-BFC2-5AD62C9BCE3C}"/>
+              </a:ext>
+            </a:extLst>
+          </p:cNvPr>
+          <p:cNvCxnSpPr>
+            <a:cxnSpLocks/>
+            <a:endCxn id="67" idx="2"/>
+          </p:cNvCxnSpPr>
+          <p:nvPr/>
+        </p:nvCxnSpPr>
+        <p:spPr>
+          <a:xfrm>
+            <a:off x="4849216" y="3331135"/>
+            <a:ext cx="2863555" cy="0"/>
+          </a:xfrm>
+          <a:prstGeom prst="straightConnector1">
+            <a:avLst/>
+          </a:prstGeom>
+          <a:ln w="19050">
+            <a:solidFill>
+              <a:srgbClr val="0070C0"/>
+            </a:solidFill>
+            <a:prstDash val="sysDash"/>
+            <a:headEnd type="arrow" w="med" len="med"/>
+            <a:tailEnd type="none" w="med" len="med"/>
+          </a:ln>
+        </p:spPr>
+        <p:style>
+          <a:lnRef idx="1">
+            <a:schemeClr val="accent1"/>
+          </a:lnRef>
+          <a:fillRef idx="0">
+            <a:schemeClr val="accent1"/>
+          </a:fillRef>
+          <a:effectRef idx="0">
+            <a:schemeClr val="accent1"/>
+          </a:effectRef>
+          <a:fontRef idx="minor">
+            <a:schemeClr val="tx1"/>
+          </a:fontRef>
+        </p:style>
+      </p:cxnSp>
     </p:spTree>
     <p:extLst>
       <p:ext uri="{BB962C8B-B14F-4D97-AF65-F5344CB8AC3E}">

</xml_diff>

<commit_message>
Refactor to improve code quality
</commit_message>
<xml_diff>
--- a/docs/diagrams/FindCommandSequenceDiagram.pptx
+++ b/docs/diagrams/FindCommandSequenceDiagram.pptx
@@ -208,7 +208,7 @@
           <a:p>
             <a:fld id="{21B4A92B-49AE-402A-A902-897E65F183DA}" type="datetimeFigureOut">
               <a:rPr lang="zh-CN" altLang="en-US" smtClean="0"/>
-              <a:t>2018/10/31</a:t>
+              <a:t>2018/11/10</a:t>
             </a:fld>
             <a:endParaRPr lang="zh-CN" altLang="en-US"/>
           </a:p>
@@ -738,7 +738,7 @@
           <a:p>
             <a:fld id="{530820CF-B880-4189-942D-D702A7CBA730}" type="datetimeFigureOut">
               <a:rPr lang="zh-CN" altLang="en-US" smtClean="0"/>
-              <a:t>2018/10/31</a:t>
+              <a:t>2018/11/10</a:t>
             </a:fld>
             <a:endParaRPr lang="zh-CN" altLang="en-US"/>
           </a:p>
@@ -901,7 +901,7 @@
           <a:p>
             <a:fld id="{530820CF-B880-4189-942D-D702A7CBA730}" type="datetimeFigureOut">
               <a:rPr lang="zh-CN" altLang="en-US" smtClean="0"/>
-              <a:t>2018/10/31</a:t>
+              <a:t>2018/11/10</a:t>
             </a:fld>
             <a:endParaRPr lang="zh-CN" altLang="en-US"/>
           </a:p>
@@ -1074,7 +1074,7 @@
           <a:p>
             <a:fld id="{530820CF-B880-4189-942D-D702A7CBA730}" type="datetimeFigureOut">
               <a:rPr lang="zh-CN" altLang="en-US" smtClean="0"/>
-              <a:t>2018/10/31</a:t>
+              <a:t>2018/11/10</a:t>
             </a:fld>
             <a:endParaRPr lang="zh-CN" altLang="en-US"/>
           </a:p>
@@ -1237,7 +1237,7 @@
           <a:p>
             <a:fld id="{530820CF-B880-4189-942D-D702A7CBA730}" type="datetimeFigureOut">
               <a:rPr lang="zh-CN" altLang="en-US" smtClean="0"/>
-              <a:t>2018/10/31</a:t>
+              <a:t>2018/11/10</a:t>
             </a:fld>
             <a:endParaRPr lang="zh-CN" altLang="en-US"/>
           </a:p>
@@ -1477,7 +1477,7 @@
           <a:p>
             <a:fld id="{530820CF-B880-4189-942D-D702A7CBA730}" type="datetimeFigureOut">
               <a:rPr lang="zh-CN" altLang="en-US" smtClean="0"/>
-              <a:t>2018/10/31</a:t>
+              <a:t>2018/11/10</a:t>
             </a:fld>
             <a:endParaRPr lang="zh-CN" altLang="en-US"/>
           </a:p>
@@ -1757,7 +1757,7 @@
           <a:p>
             <a:fld id="{530820CF-B880-4189-942D-D702A7CBA730}" type="datetimeFigureOut">
               <a:rPr lang="zh-CN" altLang="en-US" smtClean="0"/>
-              <a:t>2018/10/31</a:t>
+              <a:t>2018/11/10</a:t>
             </a:fld>
             <a:endParaRPr lang="zh-CN" altLang="en-US"/>
           </a:p>
@@ -2171,7 +2171,7 @@
           <a:p>
             <a:fld id="{530820CF-B880-4189-942D-D702A7CBA730}" type="datetimeFigureOut">
               <a:rPr lang="zh-CN" altLang="en-US" smtClean="0"/>
-              <a:t>2018/10/31</a:t>
+              <a:t>2018/11/10</a:t>
             </a:fld>
             <a:endParaRPr lang="zh-CN" altLang="en-US"/>
           </a:p>
@@ -2283,7 +2283,7 @@
           <a:p>
             <a:fld id="{530820CF-B880-4189-942D-D702A7CBA730}" type="datetimeFigureOut">
               <a:rPr lang="zh-CN" altLang="en-US" smtClean="0"/>
-              <a:t>2018/10/31</a:t>
+              <a:t>2018/11/10</a:t>
             </a:fld>
             <a:endParaRPr lang="zh-CN" altLang="en-US"/>
           </a:p>
@@ -2373,7 +2373,7 @@
           <a:p>
             <a:fld id="{530820CF-B880-4189-942D-D702A7CBA730}" type="datetimeFigureOut">
               <a:rPr lang="zh-CN" altLang="en-US" smtClean="0"/>
-              <a:t>2018/10/31</a:t>
+              <a:t>2018/11/10</a:t>
             </a:fld>
             <a:endParaRPr lang="zh-CN" altLang="en-US"/>
           </a:p>
@@ -2643,7 +2643,7 @@
           <a:p>
             <a:fld id="{530820CF-B880-4189-942D-D702A7CBA730}" type="datetimeFigureOut">
               <a:rPr lang="zh-CN" altLang="en-US" smtClean="0"/>
-              <a:t>2018/10/31</a:t>
+              <a:t>2018/11/10</a:t>
             </a:fld>
             <a:endParaRPr lang="zh-CN" altLang="en-US"/>
           </a:p>
@@ -2890,7 +2890,7 @@
           <a:p>
             <a:fld id="{530820CF-B880-4189-942D-D702A7CBA730}" type="datetimeFigureOut">
               <a:rPr lang="zh-CN" altLang="en-US" smtClean="0"/>
-              <a:t>2018/10/31</a:t>
+              <a:t>2018/11/10</a:t>
             </a:fld>
             <a:endParaRPr lang="zh-CN" altLang="en-US"/>
           </a:p>
@@ -3096,7 +3096,7 @@
           <a:p>
             <a:fld id="{530820CF-B880-4189-942D-D702A7CBA730}" type="datetimeFigureOut">
               <a:rPr lang="zh-CN" altLang="en-US" smtClean="0"/>
-              <a:t>2018/10/31</a:t>
+              <a:t>2018/11/10</a:t>
             </a:fld>
             <a:endParaRPr lang="zh-CN" altLang="en-US"/>
           </a:p>
@@ -5188,8 +5188,8 @@
         </p:nvCxnSpPr>
         <p:spPr>
           <a:xfrm flipH="1">
-            <a:off x="4768435" y="1828802"/>
-            <a:ext cx="13436" cy="3404969"/>
+            <a:off x="4775742" y="1828802"/>
+            <a:ext cx="6129" cy="3379002"/>
           </a:xfrm>
           <a:prstGeom prst="line">
             <a:avLst/>
@@ -5412,7 +5412,7 @@
         </p:nvSpPr>
         <p:spPr>
           <a:xfrm>
-            <a:off x="4639233" y="5233771"/>
+            <a:off x="4646540" y="5207804"/>
             <a:ext cx="258404" cy="261610"/>
           </a:xfrm>
           <a:prstGeom prst="rect">
@@ -6513,7 +6513,7 @@
         <p:spPr>
           <a:xfrm>
             <a:off x="6834437" y="4699729"/>
-            <a:ext cx="0" cy="759438"/>
+            <a:ext cx="1" cy="3697823"/>
           </a:xfrm>
           <a:prstGeom prst="line">
             <a:avLst/>
@@ -6935,6 +6935,45 @@
           </a:fontRef>
         </p:style>
       </p:cxnSp>
+      <p:sp>
+        <p:nvSpPr>
+          <p:cNvPr id="70" name="TextBox 3">
+            <a:extLst>
+              <a:ext uri="{FF2B5EF4-FFF2-40B4-BE49-F238E27FC236}">
+                <a16:creationId xmlns:a16="http://schemas.microsoft.com/office/drawing/2014/main" id="{596FD0C4-4880-4925-B5DC-532527CCDB6D}"/>
+              </a:ext>
+            </a:extLst>
+          </p:cNvPr>
+          <p:cNvSpPr txBox="1"/>
+          <p:nvPr/>
+        </p:nvSpPr>
+        <p:spPr>
+          <a:xfrm>
+            <a:off x="6712970" y="8328354"/>
+            <a:ext cx="258404" cy="261610"/>
+          </a:xfrm>
+          <a:prstGeom prst="rect">
+            <a:avLst/>
+          </a:prstGeom>
+          <a:noFill/>
+        </p:spPr>
+        <p:txBody>
+          <a:bodyPr wrap="none" rtlCol="0">
+            <a:spAutoFit/>
+          </a:bodyPr>
+          <a:lstStyle/>
+          <a:p>
+            <a:r>
+              <a:rPr lang="en-SG" sz="1100" dirty="0">
+                <a:solidFill>
+                  <a:srgbClr val="002060"/>
+                </a:solidFill>
+              </a:rPr>
+              <a:t>X</a:t>
+            </a:r>
+          </a:p>
+        </p:txBody>
+      </p:sp>
     </p:spTree>
     <p:extLst>
       <p:ext uri="{BB962C8B-B14F-4D97-AF65-F5344CB8AC3E}">

</xml_diff>